<commit_message>
Updated Bar Graph Percent file
</commit_message>
<xml_diff>
--- a/Project 1 Powerpoint Final .pptx
+++ b/Project 1 Powerpoint Final .pptx
@@ -18493,10 +18493,10 @@
       </p:sp>
       <p:pic>
         <p:nvPicPr>
-          <p:cNvPr id="7" name="Picture 6" descr="A graph of green bars with white text&#10;&#10;Description automatically generated with medium confidence">
+          <p:cNvPr id="3" name="Picture 2" descr="A graph of a number of people">
             <a:extLst>
               <a:ext uri="{FF2B5EF4-FFF2-40B4-BE49-F238E27FC236}">
-                <a16:creationId xmlns:a16="http://schemas.microsoft.com/office/drawing/2014/main" id="{4B429264-0C45-4B95-066C-F60B4C2DFCE0}"/>
+                <a16:creationId xmlns:a16="http://schemas.microsoft.com/office/drawing/2014/main" id="{52E6503A-842D-9A46-CDCF-7410C5047ED1}"/>
               </a:ext>
             </a:extLst>
           </p:cNvPr>
@@ -18513,8 +18513,8 @@
         </p:blipFill>
         <p:spPr>
           <a:xfrm>
-            <a:off x="324087" y="1068575"/>
-            <a:ext cx="11317049" cy="5436098"/>
+            <a:off x="1076148" y="1265431"/>
+            <a:ext cx="9870678" cy="4612041"/>
           </a:xfrm>
           <a:prstGeom prst="rect">
             <a:avLst/>
@@ -24370,6 +24370,25 @@
 </file>
 
 <file path=customXml/item1.xml><?xml version="1.0" encoding="utf-8"?>
+<p:properties xmlns:p="http://schemas.microsoft.com/office/2006/metadata/properties" xmlns:xsi="http://www.w3.org/2001/XMLSchema-instance" xmlns:pc="http://schemas.microsoft.com/office/infopath/2007/PartnerControls">
+  <documentManagement>
+    <_ip_UnifiedCompliancePolicyUIAction xmlns="http://schemas.microsoft.com/sharepoint/v3" xsi:nil="true"/>
+    <Image xmlns="71af3243-3dd4-4a8d-8c0d-dd76da1f02a5">
+      <Url xsi:nil="true"/>
+      <Description xsi:nil="true"/>
+    </Image>
+    <Status xmlns="71af3243-3dd4-4a8d-8c0d-dd76da1f02a5">Not started</Status>
+    <_ip_UnifiedCompliancePolicyProperties xmlns="http://schemas.microsoft.com/sharepoint/v3" xsi:nil="true"/>
+    <lcf76f155ced4ddcb4097134ff3c332f xmlns="71af3243-3dd4-4a8d-8c0d-dd76da1f02a5">
+      <Terms xmlns="http://schemas.microsoft.com/office/infopath/2007/PartnerControls"/>
+    </lcf76f155ced4ddcb4097134ff3c332f>
+    <TaxCatchAll xmlns="230e9df3-be65-4c73-a93b-d1236ebd677e"/>
+    <MediaServiceKeyPoints xmlns="71af3243-3dd4-4a8d-8c0d-dd76da1f02a5" xsi:nil="true"/>
+  </documentManagement>
+</p:properties>
+</file>
+
+<file path=customXml/item2.xml><?xml version="1.0" encoding="utf-8"?>
 <ct:contentTypeSchema xmlns:ct="http://schemas.microsoft.com/office/2006/metadata/contentType" xmlns:ma="http://schemas.microsoft.com/office/2006/metadata/properties/metaAttributes" ct:_="" ma:_="" ma:contentTypeName="Document" ma:contentTypeID="0x01010079F111ED35F8CC479449609E8A0923A6" ma:contentTypeVersion="18" ma:contentTypeDescription="Create a new document." ma:contentTypeScope="" ma:versionID="22a266b9fa9a230c5a512669d8b298c3">
   <xsd:schema xmlns:xsd="http://www.w3.org/2001/XMLSchema" xmlns:xs="http://www.w3.org/2001/XMLSchema" xmlns:p="http://schemas.microsoft.com/office/2006/metadata/properties" xmlns:ns1="http://schemas.microsoft.com/sharepoint/v3" xmlns:ns2="71af3243-3dd4-4a8d-8c0d-dd76da1f02a5" xmlns:ns3="16c05727-aa75-4e4a-9b5f-8a80a1165891" xmlns:ns4="230e9df3-be65-4c73-a93b-d1236ebd677e" targetNamespace="http://schemas.microsoft.com/office/2006/metadata/properties" ma:root="true" ma:fieldsID="eddc33fff6b14141ee5c74a0d29ea6a1" ns1:_="" ns2:_="" ns3:_="" ns4:_="">
     <xsd:import namespace="http://schemas.microsoft.com/sharepoint/v3"/>
@@ -24645,25 +24664,6 @@
 </ct:contentTypeSchema>
 </file>
 
-<file path=customXml/item2.xml><?xml version="1.0" encoding="utf-8"?>
-<p:properties xmlns:p="http://schemas.microsoft.com/office/2006/metadata/properties" xmlns:xsi="http://www.w3.org/2001/XMLSchema-instance" xmlns:pc="http://schemas.microsoft.com/office/infopath/2007/PartnerControls">
-  <documentManagement>
-    <_ip_UnifiedCompliancePolicyUIAction xmlns="http://schemas.microsoft.com/sharepoint/v3" xsi:nil="true"/>
-    <Image xmlns="71af3243-3dd4-4a8d-8c0d-dd76da1f02a5">
-      <Url xsi:nil="true"/>
-      <Description xsi:nil="true"/>
-    </Image>
-    <Status xmlns="71af3243-3dd4-4a8d-8c0d-dd76da1f02a5">Not started</Status>
-    <_ip_UnifiedCompliancePolicyProperties xmlns="http://schemas.microsoft.com/sharepoint/v3" xsi:nil="true"/>
-    <lcf76f155ced4ddcb4097134ff3c332f xmlns="71af3243-3dd4-4a8d-8c0d-dd76da1f02a5">
-      <Terms xmlns="http://schemas.microsoft.com/office/infopath/2007/PartnerControls"/>
-    </lcf76f155ced4ddcb4097134ff3c332f>
-    <TaxCatchAll xmlns="230e9df3-be65-4c73-a93b-d1236ebd677e"/>
-    <MediaServiceKeyPoints xmlns="71af3243-3dd4-4a8d-8c0d-dd76da1f02a5" xsi:nil="true"/>
-  </documentManagement>
-</p:properties>
-</file>
-
 <file path=customXml/item3.xml><?xml version="1.0" encoding="utf-8"?>
 <?mso-contentType ?>
 <FormTemplates xmlns="http://schemas.microsoft.com/sharepoint/v3/contenttype/forms">
@@ -24674,6 +24674,18 @@
 </file>
 
 <file path=customXml/itemProps1.xml><?xml version="1.0" encoding="utf-8"?>
+<ds:datastoreItem xmlns:ds="http://schemas.openxmlformats.org/officeDocument/2006/customXml" ds:itemID="{50811A92-D464-4AC4-A396-BA73B10CEEAC}">
+  <ds:schemaRefs>
+    <ds:schemaRef ds:uri="http://schemas.microsoft.com/office/2006/metadata/properties"/>
+    <ds:schemaRef ds:uri="http://schemas.microsoft.com/office/infopath/2007/PartnerControls"/>
+    <ds:schemaRef ds:uri="http://schemas.microsoft.com/sharepoint/v3"/>
+    <ds:schemaRef ds:uri="71af3243-3dd4-4a8d-8c0d-dd76da1f02a5"/>
+    <ds:schemaRef ds:uri="230e9df3-be65-4c73-a93b-d1236ebd677e"/>
+  </ds:schemaRefs>
+</ds:datastoreItem>
+</file>
+
+<file path=customXml/itemProps2.xml><?xml version="1.0" encoding="utf-8"?>
 <ds:datastoreItem xmlns:ds="http://schemas.openxmlformats.org/officeDocument/2006/customXml" ds:itemID="{DE4876F9-7AE1-498D-B8FE-1E3AD703D2AF}">
   <ds:schemaRefs>
     <ds:schemaRef ds:uri="http://schemas.microsoft.com/office/2006/metadata/contentType"/>
@@ -24694,18 +24706,6 @@
 </ds:datastoreItem>
 </file>
 
-<file path=customXml/itemProps2.xml><?xml version="1.0" encoding="utf-8"?>
-<ds:datastoreItem xmlns:ds="http://schemas.openxmlformats.org/officeDocument/2006/customXml" ds:itemID="{50811A92-D464-4AC4-A396-BA73B10CEEAC}">
-  <ds:schemaRefs>
-    <ds:schemaRef ds:uri="http://schemas.microsoft.com/office/2006/metadata/properties"/>
-    <ds:schemaRef ds:uri="http://schemas.microsoft.com/office/infopath/2007/PartnerControls"/>
-    <ds:schemaRef ds:uri="http://schemas.microsoft.com/sharepoint/v3"/>
-    <ds:schemaRef ds:uri="71af3243-3dd4-4a8d-8c0d-dd76da1f02a5"/>
-    <ds:schemaRef ds:uri="230e9df3-be65-4c73-a93b-d1236ebd677e"/>
-  </ds:schemaRefs>
-</ds:datastoreItem>
-</file>
-
 <file path=customXml/itemProps3.xml><?xml version="1.0" encoding="utf-8"?>
 <ds:datastoreItem xmlns:ds="http://schemas.openxmlformats.org/officeDocument/2006/customXml" ds:itemID="{904751AB-E840-446F-8D49-E697067EC887}">
   <ds:schemaRefs>

</xml_diff>

<commit_message>
New and Improved Bar Graph
</commit_message>
<xml_diff>
--- a/Project 1 Powerpoint Final .pptx
+++ b/Project 1 Powerpoint Final .pptx
@@ -244,7 +244,7 @@
           <a:p>
             <a:fld id="{C17F2C1D-F243-42AB-ADF2-E7CB4E04900E}" type="datetimeFigureOut">
               <a:rPr lang="en-US" smtClean="0"/>
-              <a:t>8/2/2023</a:t>
+              <a:t>8/3/2023</a:t>
             </a:fld>
             <a:endParaRPr lang="en-US"/>
           </a:p>
@@ -421,7 +421,7 @@
           <a:p>
             <a:fld id="{020CE34E-5667-4A32-A6BA-10C7A552BC63}" type="datetimeFigureOut">
               <a:rPr lang="en-US" smtClean="0"/>
-              <a:t>8/2/2023</a:t>
+              <a:t>8/3/2023</a:t>
             </a:fld>
             <a:endParaRPr lang="en-US"/>
           </a:p>
@@ -941,11 +941,7 @@
           <a:p>
             <a:r>
               <a:rPr lang="en-US" dirty="0"/>
-              <a:t>Outliers were California, Massachusetts, and Mississippi</a:t>
-            </a:r>
-            <a:r>
-              <a:rPr lang="en-US"/>
-              <a:t>. </a:t>
+              <a:t>Outliers were . </a:t>
             </a:r>
           </a:p>
           <a:p>
@@ -18256,7 +18252,12 @@
             <a:fillRect/>
           </a:stretch>
         </p:blipFill>
-        <p:spPr/>
+        <p:spPr>
+          <a:xfrm>
+            <a:off x="0" y="-21902"/>
+            <a:ext cx="12192000" cy="6858000"/>
+          </a:xfrm>
+        </p:spPr>
       </p:pic>
       <p:sp>
         <p:nvSpPr>
@@ -18493,10 +18494,10 @@
       </p:sp>
       <p:pic>
         <p:nvPicPr>
-          <p:cNvPr id="7" name="Picture 6" descr="A graph of green bars with white text&#10;&#10;Description automatically generated with medium confidence">
+          <p:cNvPr id="3" name="Picture 2" descr="A graph of a number of people&#10;&#10;Description automatically generated">
             <a:extLst>
               <a:ext uri="{FF2B5EF4-FFF2-40B4-BE49-F238E27FC236}">
-                <a16:creationId xmlns:a16="http://schemas.microsoft.com/office/drawing/2014/main" id="{4B429264-0C45-4B95-066C-F60B4C2DFCE0}"/>
+                <a16:creationId xmlns:a16="http://schemas.microsoft.com/office/drawing/2014/main" id="{52A2D0CE-7ECA-58AD-9052-05063685B8B6}"/>
               </a:ext>
             </a:extLst>
           </p:cNvPr>
@@ -18513,8 +18514,8 @@
         </p:blipFill>
         <p:spPr>
           <a:xfrm>
-            <a:off x="324087" y="1068575"/>
-            <a:ext cx="11317049" cy="5436098"/>
+            <a:off x="1443003" y="1254903"/>
+            <a:ext cx="9305993" cy="4348194"/>
           </a:xfrm>
           <a:prstGeom prst="rect">
             <a:avLst/>
@@ -24370,6 +24371,25 @@
 </file>
 
 <file path=customXml/item1.xml><?xml version="1.0" encoding="utf-8"?>
+<p:properties xmlns:p="http://schemas.microsoft.com/office/2006/metadata/properties" xmlns:xsi="http://www.w3.org/2001/XMLSchema-instance" xmlns:pc="http://schemas.microsoft.com/office/infopath/2007/PartnerControls">
+  <documentManagement>
+    <_ip_UnifiedCompliancePolicyUIAction xmlns="http://schemas.microsoft.com/sharepoint/v3" xsi:nil="true"/>
+    <Image xmlns="71af3243-3dd4-4a8d-8c0d-dd76da1f02a5">
+      <Url xsi:nil="true"/>
+      <Description xsi:nil="true"/>
+    </Image>
+    <Status xmlns="71af3243-3dd4-4a8d-8c0d-dd76da1f02a5">Not started</Status>
+    <_ip_UnifiedCompliancePolicyProperties xmlns="http://schemas.microsoft.com/sharepoint/v3" xsi:nil="true"/>
+    <lcf76f155ced4ddcb4097134ff3c332f xmlns="71af3243-3dd4-4a8d-8c0d-dd76da1f02a5">
+      <Terms xmlns="http://schemas.microsoft.com/office/infopath/2007/PartnerControls"/>
+    </lcf76f155ced4ddcb4097134ff3c332f>
+    <TaxCatchAll xmlns="230e9df3-be65-4c73-a93b-d1236ebd677e"/>
+    <MediaServiceKeyPoints xmlns="71af3243-3dd4-4a8d-8c0d-dd76da1f02a5" xsi:nil="true"/>
+  </documentManagement>
+</p:properties>
+</file>
+
+<file path=customXml/item2.xml><?xml version="1.0" encoding="utf-8"?>
 <ct:contentTypeSchema xmlns:ct="http://schemas.microsoft.com/office/2006/metadata/contentType" xmlns:ma="http://schemas.microsoft.com/office/2006/metadata/properties/metaAttributes" ct:_="" ma:_="" ma:contentTypeName="Document" ma:contentTypeID="0x01010079F111ED35F8CC479449609E8A0923A6" ma:contentTypeVersion="18" ma:contentTypeDescription="Create a new document." ma:contentTypeScope="" ma:versionID="22a266b9fa9a230c5a512669d8b298c3">
   <xsd:schema xmlns:xsd="http://www.w3.org/2001/XMLSchema" xmlns:xs="http://www.w3.org/2001/XMLSchema" xmlns:p="http://schemas.microsoft.com/office/2006/metadata/properties" xmlns:ns1="http://schemas.microsoft.com/sharepoint/v3" xmlns:ns2="71af3243-3dd4-4a8d-8c0d-dd76da1f02a5" xmlns:ns3="16c05727-aa75-4e4a-9b5f-8a80a1165891" xmlns:ns4="230e9df3-be65-4c73-a93b-d1236ebd677e" targetNamespace="http://schemas.microsoft.com/office/2006/metadata/properties" ma:root="true" ma:fieldsID="eddc33fff6b14141ee5c74a0d29ea6a1" ns1:_="" ns2:_="" ns3:_="" ns4:_="">
     <xsd:import namespace="http://schemas.microsoft.com/sharepoint/v3"/>
@@ -24645,25 +24665,6 @@
 </ct:contentTypeSchema>
 </file>
 
-<file path=customXml/item2.xml><?xml version="1.0" encoding="utf-8"?>
-<p:properties xmlns:p="http://schemas.microsoft.com/office/2006/metadata/properties" xmlns:xsi="http://www.w3.org/2001/XMLSchema-instance" xmlns:pc="http://schemas.microsoft.com/office/infopath/2007/PartnerControls">
-  <documentManagement>
-    <_ip_UnifiedCompliancePolicyUIAction xmlns="http://schemas.microsoft.com/sharepoint/v3" xsi:nil="true"/>
-    <Image xmlns="71af3243-3dd4-4a8d-8c0d-dd76da1f02a5">
-      <Url xsi:nil="true"/>
-      <Description xsi:nil="true"/>
-    </Image>
-    <Status xmlns="71af3243-3dd4-4a8d-8c0d-dd76da1f02a5">Not started</Status>
-    <_ip_UnifiedCompliancePolicyProperties xmlns="http://schemas.microsoft.com/sharepoint/v3" xsi:nil="true"/>
-    <lcf76f155ced4ddcb4097134ff3c332f xmlns="71af3243-3dd4-4a8d-8c0d-dd76da1f02a5">
-      <Terms xmlns="http://schemas.microsoft.com/office/infopath/2007/PartnerControls"/>
-    </lcf76f155ced4ddcb4097134ff3c332f>
-    <TaxCatchAll xmlns="230e9df3-be65-4c73-a93b-d1236ebd677e"/>
-    <MediaServiceKeyPoints xmlns="71af3243-3dd4-4a8d-8c0d-dd76da1f02a5" xsi:nil="true"/>
-  </documentManagement>
-</p:properties>
-</file>
-
 <file path=customXml/item3.xml><?xml version="1.0" encoding="utf-8"?>
 <?mso-contentType ?>
 <FormTemplates xmlns="http://schemas.microsoft.com/sharepoint/v3/contenttype/forms">
@@ -24674,6 +24675,18 @@
 </file>
 
 <file path=customXml/itemProps1.xml><?xml version="1.0" encoding="utf-8"?>
+<ds:datastoreItem xmlns:ds="http://schemas.openxmlformats.org/officeDocument/2006/customXml" ds:itemID="{50811A92-D464-4AC4-A396-BA73B10CEEAC}">
+  <ds:schemaRefs>
+    <ds:schemaRef ds:uri="http://schemas.microsoft.com/office/2006/metadata/properties"/>
+    <ds:schemaRef ds:uri="http://schemas.microsoft.com/office/infopath/2007/PartnerControls"/>
+    <ds:schemaRef ds:uri="http://schemas.microsoft.com/sharepoint/v3"/>
+    <ds:schemaRef ds:uri="71af3243-3dd4-4a8d-8c0d-dd76da1f02a5"/>
+    <ds:schemaRef ds:uri="230e9df3-be65-4c73-a93b-d1236ebd677e"/>
+  </ds:schemaRefs>
+</ds:datastoreItem>
+</file>
+
+<file path=customXml/itemProps2.xml><?xml version="1.0" encoding="utf-8"?>
 <ds:datastoreItem xmlns:ds="http://schemas.openxmlformats.org/officeDocument/2006/customXml" ds:itemID="{DE4876F9-7AE1-498D-B8FE-1E3AD703D2AF}">
   <ds:schemaRefs>
     <ds:schemaRef ds:uri="http://schemas.microsoft.com/office/2006/metadata/contentType"/>
@@ -24694,18 +24707,6 @@
 </ds:datastoreItem>
 </file>
 
-<file path=customXml/itemProps2.xml><?xml version="1.0" encoding="utf-8"?>
-<ds:datastoreItem xmlns:ds="http://schemas.openxmlformats.org/officeDocument/2006/customXml" ds:itemID="{50811A92-D464-4AC4-A396-BA73B10CEEAC}">
-  <ds:schemaRefs>
-    <ds:schemaRef ds:uri="http://schemas.microsoft.com/office/2006/metadata/properties"/>
-    <ds:schemaRef ds:uri="http://schemas.microsoft.com/office/infopath/2007/PartnerControls"/>
-    <ds:schemaRef ds:uri="http://schemas.microsoft.com/sharepoint/v3"/>
-    <ds:schemaRef ds:uri="71af3243-3dd4-4a8d-8c0d-dd76da1f02a5"/>
-    <ds:schemaRef ds:uri="230e9df3-be65-4c73-a93b-d1236ebd677e"/>
-  </ds:schemaRefs>
-</ds:datastoreItem>
-</file>
-
 <file path=customXml/itemProps3.xml><?xml version="1.0" encoding="utf-8"?>
 <ds:datastoreItem xmlns:ds="http://schemas.openxmlformats.org/officeDocument/2006/customXml" ds:itemID="{904751AB-E840-446F-8D49-E697067EC887}">
   <ds:schemaRefs>

</xml_diff>